<commit_message>
remove non relevant comments
</commit_message>
<xml_diff>
--- a/Presentations/collections and comparable.pptx
+++ b/Presentations/collections and comparable.pptx
@@ -134,14 +134,6 @@
 </p:presentation>
 </file>
 
-<file path=ppt/revisionInfo.xml><?xml version="1.0" encoding="utf-8"?>
-<p1510:revInfo xmlns:a="http://schemas.openxmlformats.org/drawingml/2006/main" xmlns:r="http://schemas.openxmlformats.org/officeDocument/2006/relationships" xmlns:p1510="http://schemas.microsoft.com/office/powerpoint/2015/10/main">
-  <p1510:revLst>
-    <p1510:client id="{C5E2B57F-097A-455E-8736-0EAC6AF6A711}" v="5" dt="2020-01-05T10:57:58.574"/>
-  </p1510:revLst>
-</p1510:revInfo>
-</file>
-
 <file path=ppt/notesMasters/notesMaster1.xml><?xml version="1.0" encoding="utf-8"?>
 <p:notesMaster xmlns:a="http://schemas.openxmlformats.org/drawingml/2006/main" xmlns:r="http://schemas.openxmlformats.org/officeDocument/2006/relationships" xmlns:p="http://schemas.openxmlformats.org/presentationml/2006/main">
   <p:cSld>
@@ -535,45 +527,7 @@
           <a:bodyPr/>
           <a:lstStyle/>
           <a:p>
-            <a:r>
-              <a:rPr lang="en-US" sz="1200" kern="1200">
-                <a:solidFill>
-                  <a:schemeClr val="tx1"/>
-                </a:solidFill>
-                <a:effectLst/>
-                <a:latin typeface="+mn-lt"/>
-                <a:ea typeface="+mn-ea"/>
-                <a:cs typeface="+mn-cs"/>
-              </a:rPr>
-              <a:t>SF reports folder: </a:t>
-            </a:r>
-          </a:p>
-          <a:p>
-            <a:r>
-              <a:rPr lang="en-US" sz="1200" kern="1200">
-                <a:solidFill>
-                  <a:schemeClr val="tx1"/>
-                </a:solidFill>
-                <a:effectLst/>
-                <a:latin typeface="+mn-lt"/>
-                <a:ea typeface="+mn-ea"/>
-                <a:cs typeface="+mn-cs"/>
-                <a:hlinkClick r:id="rId3"/>
-              </a:rPr>
-              <a:t>https://algosec.lightning.force.com/lightning/r/Folder/00l0z0000026QAoAAM/view?queryScope=userFolders</a:t>
-            </a:r>
-            <a:endParaRPr lang="en-US" sz="1200" kern="1200">
-              <a:solidFill>
-                <a:schemeClr val="tx1"/>
-              </a:solidFill>
-              <a:effectLst/>
-              <a:latin typeface="+mn-lt"/>
-              <a:ea typeface="+mn-ea"/>
-              <a:cs typeface="+mn-cs"/>
-            </a:endParaRPr>
-          </a:p>
-          <a:p>
-            <a:endParaRPr lang="en-US"/>
+            <a:endParaRPr lang="en-US" dirty="0"/>
           </a:p>
         </p:txBody>
       </p:sp>
@@ -657,18 +611,7 @@
           <a:bodyPr/>
           <a:lstStyle/>
           <a:p>
-            <a:r>
-              <a:rPr lang="en-US"/>
-              <a:t>RBC, ZKB, </a:t>
-            </a:r>
-            <a:r>
-              <a:rPr lang="en-US" err="1"/>
-              <a:t>Schulmberger</a:t>
-            </a:r>
-            <a:r>
-              <a:rPr lang="en-US"/>
-              <a:t>, Telstra, Nets</a:t>
-            </a:r>
+            <a:endParaRPr lang="en-US" dirty="0"/>
           </a:p>
         </p:txBody>
       </p:sp>
@@ -752,18 +695,7 @@
           <a:bodyPr/>
           <a:lstStyle/>
           <a:p>
-            <a:r>
-              <a:rPr lang="en-US"/>
-              <a:t>RBC, ZKB, </a:t>
-            </a:r>
-            <a:r>
-              <a:rPr lang="en-US" err="1"/>
-              <a:t>Schulmberger</a:t>
-            </a:r>
-            <a:r>
-              <a:rPr lang="en-US"/>
-              <a:t>, Telstra, Nets</a:t>
-            </a:r>
+            <a:endParaRPr lang="en-US" dirty="0"/>
           </a:p>
         </p:txBody>
       </p:sp>
@@ -847,18 +779,7 @@
           <a:bodyPr/>
           <a:lstStyle/>
           <a:p>
-            <a:r>
-              <a:rPr lang="en-US"/>
-              <a:t>RBC, ZKB, </a:t>
-            </a:r>
-            <a:r>
-              <a:rPr lang="en-US" err="1"/>
-              <a:t>Schulmberger</a:t>
-            </a:r>
-            <a:r>
-              <a:rPr lang="en-US"/>
-              <a:t>, Telstra, Nets</a:t>
-            </a:r>
+            <a:endParaRPr lang="en-US" dirty="0"/>
           </a:p>
         </p:txBody>
       </p:sp>
@@ -942,18 +863,7 @@
           <a:bodyPr/>
           <a:lstStyle/>
           <a:p>
-            <a:r>
-              <a:rPr lang="en-US"/>
-              <a:t>RBC, ZKB, </a:t>
-            </a:r>
-            <a:r>
-              <a:rPr lang="en-US" err="1"/>
-              <a:t>Schulmberger</a:t>
-            </a:r>
-            <a:r>
-              <a:rPr lang="en-US"/>
-              <a:t>, Telstra, Nets</a:t>
-            </a:r>
+            <a:endParaRPr lang="en-US" dirty="0"/>
           </a:p>
         </p:txBody>
       </p:sp>
@@ -1037,18 +947,7 @@
           <a:bodyPr/>
           <a:lstStyle/>
           <a:p>
-            <a:r>
-              <a:rPr lang="en-US"/>
-              <a:t>RBC, ZKB, </a:t>
-            </a:r>
-            <a:r>
-              <a:rPr lang="en-US" err="1"/>
-              <a:t>Schulmberger</a:t>
-            </a:r>
-            <a:r>
-              <a:rPr lang="en-US"/>
-              <a:t>, Telstra, Nets</a:t>
-            </a:r>
+            <a:endParaRPr lang="en-US" dirty="0"/>
           </a:p>
         </p:txBody>
       </p:sp>
@@ -4037,7 +3936,7 @@
           <a:p>
             <a:r>
               <a:rPr lang="en-US" dirty="0"/>
-              <a:t>Java training #2 – Collections and comparable</a:t>
+              <a:t>Java training #2 – Collections and comparable and comparator</a:t>
             </a:r>
           </a:p>
         </p:txBody>
@@ -4316,6 +4215,514 @@
   <p:clrMapOvr>
     <a:masterClrMapping/>
   </p:clrMapOvr>
+  <p:timing>
+    <p:tnLst>
+      <p:par>
+        <p:cTn id="1" dur="indefinite" restart="never" nodeType="tmRoot">
+          <p:childTnLst>
+            <p:seq concurrent="1" nextAc="seek">
+              <p:cTn id="2" dur="indefinite" nodeType="mainSeq">
+                <p:childTnLst>
+                  <p:par>
+                    <p:cTn id="3" fill="hold">
+                      <p:stCondLst>
+                        <p:cond delay="indefinite"/>
+                      </p:stCondLst>
+                      <p:childTnLst>
+                        <p:par>
+                          <p:cTn id="4" fill="hold">
+                            <p:stCondLst>
+                              <p:cond delay="0"/>
+                            </p:stCondLst>
+                            <p:childTnLst>
+                              <p:par>
+                                <p:cTn id="5" presetID="1" presetClass="entr" presetSubtype="0" fill="hold" grpId="0" nodeType="clickEffect">
+                                  <p:stCondLst>
+                                    <p:cond delay="0"/>
+                                  </p:stCondLst>
+                                  <p:childTnLst>
+                                    <p:set>
+                                      <p:cBhvr>
+                                        <p:cTn id="6" dur="1" fill="hold">
+                                          <p:stCondLst>
+                                            <p:cond delay="0"/>
+                                          </p:stCondLst>
+                                        </p:cTn>
+                                        <p:tgtEl>
+                                          <p:spTgt spid="3">
+                                            <p:txEl>
+                                              <p:pRg st="0" end="0"/>
+                                            </p:txEl>
+                                          </p:spTgt>
+                                        </p:tgtEl>
+                                        <p:attrNameLst>
+                                          <p:attrName>style.visibility</p:attrName>
+                                        </p:attrNameLst>
+                                      </p:cBhvr>
+                                      <p:to>
+                                        <p:strVal val="visible"/>
+                                      </p:to>
+                                    </p:set>
+                                  </p:childTnLst>
+                                </p:cTn>
+                              </p:par>
+                            </p:childTnLst>
+                          </p:cTn>
+                        </p:par>
+                      </p:childTnLst>
+                    </p:cTn>
+                  </p:par>
+                  <p:par>
+                    <p:cTn id="7" fill="hold">
+                      <p:stCondLst>
+                        <p:cond delay="indefinite"/>
+                      </p:stCondLst>
+                      <p:childTnLst>
+                        <p:par>
+                          <p:cTn id="8" fill="hold">
+                            <p:stCondLst>
+                              <p:cond delay="0"/>
+                            </p:stCondLst>
+                            <p:childTnLst>
+                              <p:par>
+                                <p:cTn id="9" presetID="1" presetClass="entr" presetSubtype="0" fill="hold" grpId="0" nodeType="clickEffect">
+                                  <p:stCondLst>
+                                    <p:cond delay="0"/>
+                                  </p:stCondLst>
+                                  <p:childTnLst>
+                                    <p:set>
+                                      <p:cBhvr>
+                                        <p:cTn id="10" dur="1" fill="hold">
+                                          <p:stCondLst>
+                                            <p:cond delay="0"/>
+                                          </p:stCondLst>
+                                        </p:cTn>
+                                        <p:tgtEl>
+                                          <p:spTgt spid="3">
+                                            <p:txEl>
+                                              <p:pRg st="1" end="1"/>
+                                            </p:txEl>
+                                          </p:spTgt>
+                                        </p:tgtEl>
+                                        <p:attrNameLst>
+                                          <p:attrName>style.visibility</p:attrName>
+                                        </p:attrNameLst>
+                                      </p:cBhvr>
+                                      <p:to>
+                                        <p:strVal val="visible"/>
+                                      </p:to>
+                                    </p:set>
+                                  </p:childTnLst>
+                                </p:cTn>
+                              </p:par>
+                            </p:childTnLst>
+                          </p:cTn>
+                        </p:par>
+                      </p:childTnLst>
+                    </p:cTn>
+                  </p:par>
+                  <p:par>
+                    <p:cTn id="11" fill="hold">
+                      <p:stCondLst>
+                        <p:cond delay="indefinite"/>
+                      </p:stCondLst>
+                      <p:childTnLst>
+                        <p:par>
+                          <p:cTn id="12" fill="hold">
+                            <p:stCondLst>
+                              <p:cond delay="0"/>
+                            </p:stCondLst>
+                            <p:childTnLst>
+                              <p:par>
+                                <p:cTn id="13" presetID="1" presetClass="entr" presetSubtype="0" fill="hold" grpId="0" nodeType="clickEffect">
+                                  <p:stCondLst>
+                                    <p:cond delay="0"/>
+                                  </p:stCondLst>
+                                  <p:childTnLst>
+                                    <p:set>
+                                      <p:cBhvr>
+                                        <p:cTn id="14" dur="1" fill="hold">
+                                          <p:stCondLst>
+                                            <p:cond delay="0"/>
+                                          </p:stCondLst>
+                                        </p:cTn>
+                                        <p:tgtEl>
+                                          <p:spTgt spid="3">
+                                            <p:txEl>
+                                              <p:pRg st="2" end="2"/>
+                                            </p:txEl>
+                                          </p:spTgt>
+                                        </p:tgtEl>
+                                        <p:attrNameLst>
+                                          <p:attrName>style.visibility</p:attrName>
+                                        </p:attrNameLst>
+                                      </p:cBhvr>
+                                      <p:to>
+                                        <p:strVal val="visible"/>
+                                      </p:to>
+                                    </p:set>
+                                  </p:childTnLst>
+                                </p:cTn>
+                              </p:par>
+                              <p:par>
+                                <p:cTn id="15" presetID="1" presetClass="entr" presetSubtype="0" fill="hold" grpId="0" nodeType="withEffect">
+                                  <p:stCondLst>
+                                    <p:cond delay="0"/>
+                                  </p:stCondLst>
+                                  <p:childTnLst>
+                                    <p:set>
+                                      <p:cBhvr>
+                                        <p:cTn id="16" dur="1" fill="hold">
+                                          <p:stCondLst>
+                                            <p:cond delay="0"/>
+                                          </p:stCondLst>
+                                        </p:cTn>
+                                        <p:tgtEl>
+                                          <p:spTgt spid="3">
+                                            <p:txEl>
+                                              <p:pRg st="3" end="3"/>
+                                            </p:txEl>
+                                          </p:spTgt>
+                                        </p:tgtEl>
+                                        <p:attrNameLst>
+                                          <p:attrName>style.visibility</p:attrName>
+                                        </p:attrNameLst>
+                                      </p:cBhvr>
+                                      <p:to>
+                                        <p:strVal val="visible"/>
+                                      </p:to>
+                                    </p:set>
+                                  </p:childTnLst>
+                                </p:cTn>
+                              </p:par>
+                              <p:par>
+                                <p:cTn id="17" presetID="1" presetClass="entr" presetSubtype="0" fill="hold" grpId="0" nodeType="withEffect">
+                                  <p:stCondLst>
+                                    <p:cond delay="0"/>
+                                  </p:stCondLst>
+                                  <p:childTnLst>
+                                    <p:set>
+                                      <p:cBhvr>
+                                        <p:cTn id="18" dur="1" fill="hold">
+                                          <p:stCondLst>
+                                            <p:cond delay="0"/>
+                                          </p:stCondLst>
+                                        </p:cTn>
+                                        <p:tgtEl>
+                                          <p:spTgt spid="3">
+                                            <p:txEl>
+                                              <p:pRg st="4" end="4"/>
+                                            </p:txEl>
+                                          </p:spTgt>
+                                        </p:tgtEl>
+                                        <p:attrNameLst>
+                                          <p:attrName>style.visibility</p:attrName>
+                                        </p:attrNameLst>
+                                      </p:cBhvr>
+                                      <p:to>
+                                        <p:strVal val="visible"/>
+                                      </p:to>
+                                    </p:set>
+                                  </p:childTnLst>
+                                </p:cTn>
+                              </p:par>
+                              <p:par>
+                                <p:cTn id="19" presetID="1" presetClass="entr" presetSubtype="0" fill="hold" grpId="0" nodeType="withEffect">
+                                  <p:stCondLst>
+                                    <p:cond delay="0"/>
+                                  </p:stCondLst>
+                                  <p:childTnLst>
+                                    <p:set>
+                                      <p:cBhvr>
+                                        <p:cTn id="20" dur="1" fill="hold">
+                                          <p:stCondLst>
+                                            <p:cond delay="0"/>
+                                          </p:stCondLst>
+                                        </p:cTn>
+                                        <p:tgtEl>
+                                          <p:spTgt spid="3">
+                                            <p:txEl>
+                                              <p:pRg st="5" end="5"/>
+                                            </p:txEl>
+                                          </p:spTgt>
+                                        </p:tgtEl>
+                                        <p:attrNameLst>
+                                          <p:attrName>style.visibility</p:attrName>
+                                        </p:attrNameLst>
+                                      </p:cBhvr>
+                                      <p:to>
+                                        <p:strVal val="visible"/>
+                                      </p:to>
+                                    </p:set>
+                                  </p:childTnLst>
+                                </p:cTn>
+                              </p:par>
+                              <p:par>
+                                <p:cTn id="21" presetID="1" presetClass="entr" presetSubtype="0" fill="hold" grpId="0" nodeType="withEffect">
+                                  <p:stCondLst>
+                                    <p:cond delay="0"/>
+                                  </p:stCondLst>
+                                  <p:childTnLst>
+                                    <p:set>
+                                      <p:cBhvr>
+                                        <p:cTn id="22" dur="1" fill="hold">
+                                          <p:stCondLst>
+                                            <p:cond delay="0"/>
+                                          </p:stCondLst>
+                                        </p:cTn>
+                                        <p:tgtEl>
+                                          <p:spTgt spid="3">
+                                            <p:txEl>
+                                              <p:pRg st="6" end="6"/>
+                                            </p:txEl>
+                                          </p:spTgt>
+                                        </p:tgtEl>
+                                        <p:attrNameLst>
+                                          <p:attrName>style.visibility</p:attrName>
+                                        </p:attrNameLst>
+                                      </p:cBhvr>
+                                      <p:to>
+                                        <p:strVal val="visible"/>
+                                      </p:to>
+                                    </p:set>
+                                  </p:childTnLst>
+                                </p:cTn>
+                              </p:par>
+                              <p:par>
+                                <p:cTn id="23" presetID="1" presetClass="entr" presetSubtype="0" fill="hold" grpId="0" nodeType="withEffect">
+                                  <p:stCondLst>
+                                    <p:cond delay="0"/>
+                                  </p:stCondLst>
+                                  <p:childTnLst>
+                                    <p:set>
+                                      <p:cBhvr>
+                                        <p:cTn id="24" dur="1" fill="hold">
+                                          <p:stCondLst>
+                                            <p:cond delay="0"/>
+                                          </p:stCondLst>
+                                        </p:cTn>
+                                        <p:tgtEl>
+                                          <p:spTgt spid="3">
+                                            <p:txEl>
+                                              <p:pRg st="7" end="7"/>
+                                            </p:txEl>
+                                          </p:spTgt>
+                                        </p:tgtEl>
+                                        <p:attrNameLst>
+                                          <p:attrName>style.visibility</p:attrName>
+                                        </p:attrNameLst>
+                                      </p:cBhvr>
+                                      <p:to>
+                                        <p:strVal val="visible"/>
+                                      </p:to>
+                                    </p:set>
+                                  </p:childTnLst>
+                                </p:cTn>
+                              </p:par>
+                            </p:childTnLst>
+                          </p:cTn>
+                        </p:par>
+                      </p:childTnLst>
+                    </p:cTn>
+                  </p:par>
+                  <p:par>
+                    <p:cTn id="25" fill="hold">
+                      <p:stCondLst>
+                        <p:cond delay="indefinite"/>
+                      </p:stCondLst>
+                      <p:childTnLst>
+                        <p:par>
+                          <p:cTn id="26" fill="hold">
+                            <p:stCondLst>
+                              <p:cond delay="0"/>
+                            </p:stCondLst>
+                            <p:childTnLst>
+                              <p:par>
+                                <p:cTn id="27" presetID="1" presetClass="entr" presetSubtype="0" fill="hold" grpId="0" nodeType="clickEffect">
+                                  <p:stCondLst>
+                                    <p:cond delay="0"/>
+                                  </p:stCondLst>
+                                  <p:childTnLst>
+                                    <p:set>
+                                      <p:cBhvr>
+                                        <p:cTn id="28" dur="1" fill="hold">
+                                          <p:stCondLst>
+                                            <p:cond delay="0"/>
+                                          </p:stCondLst>
+                                        </p:cTn>
+                                        <p:tgtEl>
+                                          <p:spTgt spid="3">
+                                            <p:txEl>
+                                              <p:pRg st="8" end="8"/>
+                                            </p:txEl>
+                                          </p:spTgt>
+                                        </p:tgtEl>
+                                        <p:attrNameLst>
+                                          <p:attrName>style.visibility</p:attrName>
+                                        </p:attrNameLst>
+                                      </p:cBhvr>
+                                      <p:to>
+                                        <p:strVal val="visible"/>
+                                      </p:to>
+                                    </p:set>
+                                  </p:childTnLst>
+                                </p:cTn>
+                              </p:par>
+                              <p:par>
+                                <p:cTn id="29" presetID="1" presetClass="entr" presetSubtype="0" fill="hold" grpId="0" nodeType="withEffect">
+                                  <p:stCondLst>
+                                    <p:cond delay="0"/>
+                                  </p:stCondLst>
+                                  <p:childTnLst>
+                                    <p:set>
+                                      <p:cBhvr>
+                                        <p:cTn id="30" dur="1" fill="hold">
+                                          <p:stCondLst>
+                                            <p:cond delay="0"/>
+                                          </p:stCondLst>
+                                        </p:cTn>
+                                        <p:tgtEl>
+                                          <p:spTgt spid="3">
+                                            <p:txEl>
+                                              <p:pRg st="9" end="9"/>
+                                            </p:txEl>
+                                          </p:spTgt>
+                                        </p:tgtEl>
+                                        <p:attrNameLst>
+                                          <p:attrName>style.visibility</p:attrName>
+                                        </p:attrNameLst>
+                                      </p:cBhvr>
+                                      <p:to>
+                                        <p:strVal val="visible"/>
+                                      </p:to>
+                                    </p:set>
+                                  </p:childTnLst>
+                                </p:cTn>
+                              </p:par>
+                              <p:par>
+                                <p:cTn id="31" presetID="1" presetClass="entr" presetSubtype="0" fill="hold" grpId="0" nodeType="withEffect">
+                                  <p:stCondLst>
+                                    <p:cond delay="0"/>
+                                  </p:stCondLst>
+                                  <p:childTnLst>
+                                    <p:set>
+                                      <p:cBhvr>
+                                        <p:cTn id="32" dur="1" fill="hold">
+                                          <p:stCondLst>
+                                            <p:cond delay="0"/>
+                                          </p:stCondLst>
+                                        </p:cTn>
+                                        <p:tgtEl>
+                                          <p:spTgt spid="3">
+                                            <p:txEl>
+                                              <p:pRg st="10" end="10"/>
+                                            </p:txEl>
+                                          </p:spTgt>
+                                        </p:tgtEl>
+                                        <p:attrNameLst>
+                                          <p:attrName>style.visibility</p:attrName>
+                                        </p:attrNameLst>
+                                      </p:cBhvr>
+                                      <p:to>
+                                        <p:strVal val="visible"/>
+                                      </p:to>
+                                    </p:set>
+                                  </p:childTnLst>
+                                </p:cTn>
+                              </p:par>
+                              <p:par>
+                                <p:cTn id="33" presetID="1" presetClass="entr" presetSubtype="0" fill="hold" grpId="0" nodeType="withEffect">
+                                  <p:stCondLst>
+                                    <p:cond delay="0"/>
+                                  </p:stCondLst>
+                                  <p:childTnLst>
+                                    <p:set>
+                                      <p:cBhvr>
+                                        <p:cTn id="34" dur="1" fill="hold">
+                                          <p:stCondLst>
+                                            <p:cond delay="0"/>
+                                          </p:stCondLst>
+                                        </p:cTn>
+                                        <p:tgtEl>
+                                          <p:spTgt spid="3">
+                                            <p:txEl>
+                                              <p:pRg st="11" end="11"/>
+                                            </p:txEl>
+                                          </p:spTgt>
+                                        </p:tgtEl>
+                                        <p:attrNameLst>
+                                          <p:attrName>style.visibility</p:attrName>
+                                        </p:attrNameLst>
+                                      </p:cBhvr>
+                                      <p:to>
+                                        <p:strVal val="visible"/>
+                                      </p:to>
+                                    </p:set>
+                                  </p:childTnLst>
+                                </p:cTn>
+                              </p:par>
+                              <p:par>
+                                <p:cTn id="35" presetID="1" presetClass="entr" presetSubtype="0" fill="hold" grpId="0" nodeType="withEffect">
+                                  <p:stCondLst>
+                                    <p:cond delay="0"/>
+                                  </p:stCondLst>
+                                  <p:childTnLst>
+                                    <p:set>
+                                      <p:cBhvr>
+                                        <p:cTn id="36" dur="1" fill="hold">
+                                          <p:stCondLst>
+                                            <p:cond delay="0"/>
+                                          </p:stCondLst>
+                                        </p:cTn>
+                                        <p:tgtEl>
+                                          <p:spTgt spid="3">
+                                            <p:txEl>
+                                              <p:pRg st="12" end="12"/>
+                                            </p:txEl>
+                                          </p:spTgt>
+                                        </p:tgtEl>
+                                        <p:attrNameLst>
+                                          <p:attrName>style.visibility</p:attrName>
+                                        </p:attrNameLst>
+                                      </p:cBhvr>
+                                      <p:to>
+                                        <p:strVal val="visible"/>
+                                      </p:to>
+                                    </p:set>
+                                  </p:childTnLst>
+                                </p:cTn>
+                              </p:par>
+                            </p:childTnLst>
+                          </p:cTn>
+                        </p:par>
+                      </p:childTnLst>
+                    </p:cTn>
+                  </p:par>
+                </p:childTnLst>
+              </p:cTn>
+              <p:prevCondLst>
+                <p:cond evt="onPrev" delay="0">
+                  <p:tgtEl>
+                    <p:sldTgt/>
+                  </p:tgtEl>
+                </p:cond>
+              </p:prevCondLst>
+              <p:nextCondLst>
+                <p:cond evt="onNext" delay="0">
+                  <p:tgtEl>
+                    <p:sldTgt/>
+                  </p:tgtEl>
+                </p:cond>
+              </p:nextCondLst>
+            </p:seq>
+          </p:childTnLst>
+        </p:cTn>
+      </p:par>
+    </p:tnLst>
+    <p:bldLst>
+      <p:bldP spid="3" grpId="0" build="p"/>
+    </p:bldLst>
+  </p:timing>
 </p:sld>
 </file>
 

</xml_diff>